<commit_message>
changed fig intro psd ylabel
</commit_message>
<xml_diff>
--- a/Fig/Intro/Intro_Sleep_Stages_PSD/concat.pptx
+++ b/Fig/Intro/Intro_Sleep_Stages_PSD/concat.pptx
@@ -198,7 +198,7 @@
           <a:p>
             <a:fld id="{0E550C5A-6B4D-4A23-91EF-DD1BF609100F}" type="datetimeFigureOut">
               <a:rPr lang="en-US" smtClean="0"/>
-              <a:t>6/2/2017</a:t>
+              <a:t>10/18/2017</a:t>
             </a:fld>
             <a:endParaRPr lang="en-US"/>
           </a:p>
@@ -597,7 +597,7 @@
           <a:p>
             <a:fld id="{EADA76B0-8258-4075-BC68-875521FFC394}" type="datetimeFigureOut">
               <a:rPr lang="en-US" smtClean="0"/>
-              <a:t>6/2/2017</a:t>
+              <a:t>10/18/2017</a:t>
             </a:fld>
             <a:endParaRPr lang="en-US"/>
           </a:p>
@@ -767,7 +767,7 @@
           <a:p>
             <a:fld id="{EADA76B0-8258-4075-BC68-875521FFC394}" type="datetimeFigureOut">
               <a:rPr lang="en-US" smtClean="0"/>
-              <a:t>6/2/2017</a:t>
+              <a:t>10/18/2017</a:t>
             </a:fld>
             <a:endParaRPr lang="en-US"/>
           </a:p>
@@ -947,7 +947,7 @@
           <a:p>
             <a:fld id="{EADA76B0-8258-4075-BC68-875521FFC394}" type="datetimeFigureOut">
               <a:rPr lang="en-US" smtClean="0"/>
-              <a:t>6/2/2017</a:t>
+              <a:t>10/18/2017</a:t>
             </a:fld>
             <a:endParaRPr lang="en-US"/>
           </a:p>
@@ -1117,7 +1117,7 @@
           <a:p>
             <a:fld id="{EADA76B0-8258-4075-BC68-875521FFC394}" type="datetimeFigureOut">
               <a:rPr lang="en-US" smtClean="0"/>
-              <a:t>6/2/2017</a:t>
+              <a:t>10/18/2017</a:t>
             </a:fld>
             <a:endParaRPr lang="en-US"/>
           </a:p>
@@ -1363,7 +1363,7 @@
           <a:p>
             <a:fld id="{EADA76B0-8258-4075-BC68-875521FFC394}" type="datetimeFigureOut">
               <a:rPr lang="en-US" smtClean="0"/>
-              <a:t>6/2/2017</a:t>
+              <a:t>10/18/2017</a:t>
             </a:fld>
             <a:endParaRPr lang="en-US"/>
           </a:p>
@@ -1595,7 +1595,7 @@
           <a:p>
             <a:fld id="{EADA76B0-8258-4075-BC68-875521FFC394}" type="datetimeFigureOut">
               <a:rPr lang="en-US" smtClean="0"/>
-              <a:t>6/2/2017</a:t>
+              <a:t>10/18/2017</a:t>
             </a:fld>
             <a:endParaRPr lang="en-US"/>
           </a:p>
@@ -1962,7 +1962,7 @@
           <a:p>
             <a:fld id="{EADA76B0-8258-4075-BC68-875521FFC394}" type="datetimeFigureOut">
               <a:rPr lang="en-US" smtClean="0"/>
-              <a:t>6/2/2017</a:t>
+              <a:t>10/18/2017</a:t>
             </a:fld>
             <a:endParaRPr lang="en-US"/>
           </a:p>
@@ -2080,7 +2080,7 @@
           <a:p>
             <a:fld id="{EADA76B0-8258-4075-BC68-875521FFC394}" type="datetimeFigureOut">
               <a:rPr lang="en-US" smtClean="0"/>
-              <a:t>6/2/2017</a:t>
+              <a:t>10/18/2017</a:t>
             </a:fld>
             <a:endParaRPr lang="en-US"/>
           </a:p>
@@ -2175,7 +2175,7 @@
           <a:p>
             <a:fld id="{EADA76B0-8258-4075-BC68-875521FFC394}" type="datetimeFigureOut">
               <a:rPr lang="en-US" smtClean="0"/>
-              <a:t>6/2/2017</a:t>
+              <a:t>10/18/2017</a:t>
             </a:fld>
             <a:endParaRPr lang="en-US"/>
           </a:p>
@@ -2452,7 +2452,7 @@
           <a:p>
             <a:fld id="{EADA76B0-8258-4075-BC68-875521FFC394}" type="datetimeFigureOut">
               <a:rPr lang="en-US" smtClean="0"/>
-              <a:t>6/2/2017</a:t>
+              <a:t>10/18/2017</a:t>
             </a:fld>
             <a:endParaRPr lang="en-US"/>
           </a:p>
@@ -2705,7 +2705,7 @@
           <a:p>
             <a:fld id="{EADA76B0-8258-4075-BC68-875521FFC394}" type="datetimeFigureOut">
               <a:rPr lang="en-US" smtClean="0"/>
-              <a:t>6/2/2017</a:t>
+              <a:t>10/18/2017</a:t>
             </a:fld>
             <a:endParaRPr lang="en-US"/>
           </a:p>
@@ -2918,7 +2918,7 @@
           <a:p>
             <a:fld id="{EADA76B0-8258-4075-BC68-875521FFC394}" type="datetimeFigureOut">
               <a:rPr lang="en-US" smtClean="0"/>
-              <a:t>6/2/2017</a:t>
+              <a:t>10/18/2017</a:t>
             </a:fld>
             <a:endParaRPr lang="en-US"/>
           </a:p>
@@ -4667,7 +4667,7 @@
                 <a:ea typeface="Open Sans" panose="020B0606030504020204" pitchFamily="34" charset="0"/>
                 <a:cs typeface="Open Sans" panose="020B0606030504020204" pitchFamily="34" charset="0"/>
               </a:rPr>
-              <a:t>Amplitude [µV]</a:t>
+              <a:t>Frequency [Hz]</a:t>
             </a:r>
             <a:endParaRPr lang="en-US" sz="600" dirty="0">
               <a:latin typeface="Open Sans" panose="020B0606030504020204" pitchFamily="34" charset="0"/>

</xml_diff>